<commit_message>
Cleanup of duplicated code
</commit_message>
<xml_diff>
--- a/inspire-100/common/img/AppLogos.pptx
+++ b/inspire-100/common/img/AppLogos.pptx
@@ -272,7 +272,7 @@
           <a:p>
             <a:fld id="{4967892D-CE2D-495A-A9CA-7CB88C831AAA}" type="datetimeFigureOut">
               <a:rPr lang="en-IN" smtClean="0"/>
-              <a:t>05-03-2024</a:t>
+              <a:t>17-06-2024</a:t>
             </a:fld>
             <a:endParaRPr lang="en-IN"/>
           </a:p>
@@ -472,7 +472,7 @@
           <a:p>
             <a:fld id="{4967892D-CE2D-495A-A9CA-7CB88C831AAA}" type="datetimeFigureOut">
               <a:rPr lang="en-IN" smtClean="0"/>
-              <a:t>05-03-2024</a:t>
+              <a:t>17-06-2024</a:t>
             </a:fld>
             <a:endParaRPr lang="en-IN"/>
           </a:p>
@@ -682,7 +682,7 @@
           <a:p>
             <a:fld id="{4967892D-CE2D-495A-A9CA-7CB88C831AAA}" type="datetimeFigureOut">
               <a:rPr lang="en-IN" smtClean="0"/>
-              <a:t>05-03-2024</a:t>
+              <a:t>17-06-2024</a:t>
             </a:fld>
             <a:endParaRPr lang="en-IN"/>
           </a:p>
@@ -882,7 +882,7 @@
           <a:p>
             <a:fld id="{4967892D-CE2D-495A-A9CA-7CB88C831AAA}" type="datetimeFigureOut">
               <a:rPr lang="en-IN" smtClean="0"/>
-              <a:t>05-03-2024</a:t>
+              <a:t>17-06-2024</a:t>
             </a:fld>
             <a:endParaRPr lang="en-IN"/>
           </a:p>
@@ -1158,7 +1158,7 @@
           <a:p>
             <a:fld id="{4967892D-CE2D-495A-A9CA-7CB88C831AAA}" type="datetimeFigureOut">
               <a:rPr lang="en-IN" smtClean="0"/>
-              <a:t>05-03-2024</a:t>
+              <a:t>17-06-2024</a:t>
             </a:fld>
             <a:endParaRPr lang="en-IN"/>
           </a:p>
@@ -1426,7 +1426,7 @@
           <a:p>
             <a:fld id="{4967892D-CE2D-495A-A9CA-7CB88C831AAA}" type="datetimeFigureOut">
               <a:rPr lang="en-IN" smtClean="0"/>
-              <a:t>05-03-2024</a:t>
+              <a:t>17-06-2024</a:t>
             </a:fld>
             <a:endParaRPr lang="en-IN"/>
           </a:p>
@@ -1841,7 +1841,7 @@
           <a:p>
             <a:fld id="{4967892D-CE2D-495A-A9CA-7CB88C831AAA}" type="datetimeFigureOut">
               <a:rPr lang="en-IN" smtClean="0"/>
-              <a:t>05-03-2024</a:t>
+              <a:t>17-06-2024</a:t>
             </a:fld>
             <a:endParaRPr lang="en-IN"/>
           </a:p>
@@ -1983,7 +1983,7 @@
           <a:p>
             <a:fld id="{4967892D-CE2D-495A-A9CA-7CB88C831AAA}" type="datetimeFigureOut">
               <a:rPr lang="en-IN" smtClean="0"/>
-              <a:t>05-03-2024</a:t>
+              <a:t>17-06-2024</a:t>
             </a:fld>
             <a:endParaRPr lang="en-IN"/>
           </a:p>
@@ -2096,7 +2096,7 @@
           <a:p>
             <a:fld id="{4967892D-CE2D-495A-A9CA-7CB88C831AAA}" type="datetimeFigureOut">
               <a:rPr lang="en-IN" smtClean="0"/>
-              <a:t>05-03-2024</a:t>
+              <a:t>17-06-2024</a:t>
             </a:fld>
             <a:endParaRPr lang="en-IN"/>
           </a:p>
@@ -2409,7 +2409,7 @@
           <a:p>
             <a:fld id="{4967892D-CE2D-495A-A9CA-7CB88C831AAA}" type="datetimeFigureOut">
               <a:rPr lang="en-IN" smtClean="0"/>
-              <a:t>05-03-2024</a:t>
+              <a:t>17-06-2024</a:t>
             </a:fld>
             <a:endParaRPr lang="en-IN"/>
           </a:p>
@@ -2698,7 +2698,7 @@
           <a:p>
             <a:fld id="{4967892D-CE2D-495A-A9CA-7CB88C831AAA}" type="datetimeFigureOut">
               <a:rPr lang="en-IN" smtClean="0"/>
-              <a:t>05-03-2024</a:t>
+              <a:t>17-06-2024</a:t>
             </a:fld>
             <a:endParaRPr lang="en-IN"/>
           </a:p>
@@ -2941,7 +2941,7 @@
           <a:p>
             <a:fld id="{4967892D-CE2D-495A-A9CA-7CB88C831AAA}" type="datetimeFigureOut">
               <a:rPr lang="en-IN" smtClean="0"/>
-              <a:t>05-03-2024</a:t>
+              <a:t>17-06-2024</a:t>
             </a:fld>
             <a:endParaRPr lang="en-IN"/>
           </a:p>
@@ -6643,7 +6643,7 @@
                   <a:latin typeface="Yu Gothic UI Semilight" panose="020B0400000000000000" pitchFamily="34" charset="-128"/>
                   <a:ea typeface="Yu Gothic UI Semilight" panose="020B0400000000000000" pitchFamily="34" charset="-128"/>
                 </a:rPr>
-                <a:t>Analyzer</a:t>
+                <a:t>Playback</a:t>
               </a:r>
               <a:endParaRPr lang="en-IN" sz="4000" dirty="0">
                 <a:solidFill>

</xml_diff>